<commit_message>
soccerbot image stream fix
</commit_message>
<xml_diff>
--- a/CoppeliaSim - Part 4 - Image Processing and OpenCV.pptx
+++ b/CoppeliaSim - Part 4 - Image Processing and OpenCV.pptx
@@ -5,7 +5,7 @@
     <p:sldMasterId id="2147483708" r:id="rId1"/>
   </p:sldMasterIdLst>
   <p:notesMasterIdLst>
-    <p:notesMasterId r:id="rId9"/>
+    <p:notesMasterId r:id="rId10"/>
   </p:notesMasterIdLst>
   <p:sldIdLst>
     <p:sldId id="256" r:id="rId2"/>
@@ -14,7 +14,8 @@
     <p:sldId id="282" r:id="rId5"/>
     <p:sldId id="284" r:id="rId6"/>
     <p:sldId id="283" r:id="rId7"/>
-    <p:sldId id="276" r:id="rId8"/>
+    <p:sldId id="285" r:id="rId8"/>
+    <p:sldId id="276" r:id="rId9"/>
   </p:sldIdLst>
   <p:sldSz cx="12192000" cy="6858000"/>
   <p:notesSz cx="6858000" cy="9144000"/>
@@ -203,7 +204,7 @@
           <a:p>
             <a:fld id="{4A62082B-1C29-4804-99DD-246674A55DF9}" type="datetimeFigureOut">
               <a:rPr lang="en-US" smtClean="0"/>
-              <a:t>1/31/2023</a:t>
+              <a:t>2/2/2023</a:t>
             </a:fld>
             <a:endParaRPr lang="en-US"/>
           </a:p>
@@ -712,6 +713,90 @@
     </p:spTree>
     <p:extLst>
       <p:ext uri="{BB962C8B-B14F-4D97-AF65-F5344CB8AC3E}">
+        <p14:creationId xmlns:p14="http://schemas.microsoft.com/office/powerpoint/2010/main" val="4081501883"/>
+      </p:ext>
+    </p:extLst>
+  </p:cSld>
+  <p:clrMapOvr>
+    <a:masterClrMapping/>
+  </p:clrMapOvr>
+</p:notes>
+</file>
+
+<file path=ppt/notesSlides/notesSlide4.xml><?xml version="1.0" encoding="utf-8"?>
+<p:notes xmlns:a="http://schemas.openxmlformats.org/drawingml/2006/main" xmlns:r="http://schemas.openxmlformats.org/officeDocument/2006/relationships" xmlns:p="http://schemas.openxmlformats.org/presentationml/2006/main">
+  <p:cSld>
+    <p:spTree>
+      <p:nvGrpSpPr>
+        <p:cNvPr id="1" name=""/>
+        <p:cNvGrpSpPr/>
+        <p:nvPr/>
+      </p:nvGrpSpPr>
+      <p:grpSpPr>
+        <a:xfrm>
+          <a:off x="0" y="0"/>
+          <a:ext cx="0" cy="0"/>
+          <a:chOff x="0" y="0"/>
+          <a:chExt cx="0" cy="0"/>
+        </a:xfrm>
+      </p:grpSpPr>
+      <p:sp>
+        <p:nvSpPr>
+          <p:cNvPr id="2" name="Slide Image Placeholder 1"/>
+          <p:cNvSpPr>
+            <a:spLocks noGrp="1" noRot="1" noChangeAspect="1"/>
+          </p:cNvSpPr>
+          <p:nvPr>
+            <p:ph type="sldImg"/>
+          </p:nvPr>
+        </p:nvSpPr>
+        <p:spPr/>
+      </p:sp>
+      <p:sp>
+        <p:nvSpPr>
+          <p:cNvPr id="3" name="Notes Placeholder 2"/>
+          <p:cNvSpPr>
+            <a:spLocks noGrp="1"/>
+          </p:cNvSpPr>
+          <p:nvPr>
+            <p:ph type="body" idx="1"/>
+          </p:nvPr>
+        </p:nvSpPr>
+        <p:spPr/>
+        <p:txBody>
+          <a:bodyPr/>
+          <a:lstStyle/>
+          <a:p>
+            <a:endParaRPr lang="en-US" dirty="0"/>
+          </a:p>
+        </p:txBody>
+      </p:sp>
+      <p:sp>
+        <p:nvSpPr>
+          <p:cNvPr id="4" name="Slide Number Placeholder 3"/>
+          <p:cNvSpPr>
+            <a:spLocks noGrp="1"/>
+          </p:cNvSpPr>
+          <p:nvPr>
+            <p:ph type="sldNum" sz="quarter" idx="5"/>
+          </p:nvPr>
+        </p:nvSpPr>
+        <p:spPr/>
+        <p:txBody>
+          <a:bodyPr/>
+          <a:lstStyle/>
+          <a:p>
+            <a:fld id="{1773E84B-E594-4DC7-9C67-2F5A45A50CE3}" type="slidenum">
+              <a:rPr lang="en-US" smtClean="0"/>
+              <a:t>8</a:t>
+            </a:fld>
+            <a:endParaRPr lang="en-US"/>
+          </a:p>
+        </p:txBody>
+      </p:sp>
+    </p:spTree>
+    <p:extLst>
+      <p:ext uri="{BB962C8B-B14F-4D97-AF65-F5344CB8AC3E}">
         <p14:creationId xmlns:p14="http://schemas.microsoft.com/office/powerpoint/2010/main" val="2698582567"/>
       </p:ext>
     </p:extLst>
@@ -1125,7 +1210,7 @@
           <a:p>
             <a:fld id="{E7E98992-F9BC-4325-BDEC-D59B877EF259}" type="datetimeFigureOut">
               <a:rPr lang="en-US" smtClean="0"/>
-              <a:t>1/31/2023</a:t>
+              <a:t>2/2/2023</a:t>
             </a:fld>
             <a:endParaRPr lang="en-US"/>
           </a:p>
@@ -1304,7 +1389,7 @@
           <a:p>
             <a:fld id="{E7E98992-F9BC-4325-BDEC-D59B877EF259}" type="datetimeFigureOut">
               <a:rPr lang="en-US" smtClean="0"/>
-              <a:t>1/31/2023</a:t>
+              <a:t>2/2/2023</a:t>
             </a:fld>
             <a:endParaRPr lang="en-US"/>
           </a:p>
@@ -1484,7 +1569,7 @@
           <a:p>
             <a:fld id="{E7E98992-F9BC-4325-BDEC-D59B877EF259}" type="datetimeFigureOut">
               <a:rPr lang="en-US" smtClean="0"/>
-              <a:t>1/31/2023</a:t>
+              <a:t>2/2/2023</a:t>
             </a:fld>
             <a:endParaRPr lang="en-US"/>
           </a:p>
@@ -1654,7 +1739,7 @@
           <a:p>
             <a:fld id="{E7E98992-F9BC-4325-BDEC-D59B877EF259}" type="datetimeFigureOut">
               <a:rPr lang="en-US" smtClean="0"/>
-              <a:t>1/31/2023</a:t>
+              <a:t>2/2/2023</a:t>
             </a:fld>
             <a:endParaRPr lang="en-US"/>
           </a:p>
@@ -1967,7 +2052,7 @@
           <a:p>
             <a:fld id="{E7E98992-F9BC-4325-BDEC-D59B877EF259}" type="datetimeFigureOut">
               <a:rPr lang="en-US" smtClean="0"/>
-              <a:t>1/31/2023</a:t>
+              <a:t>2/2/2023</a:t>
             </a:fld>
             <a:endParaRPr lang="en-US"/>
           </a:p>
@@ -2353,7 +2438,7 @@
           <a:p>
             <a:fld id="{E7E98992-F9BC-4325-BDEC-D59B877EF259}" type="datetimeFigureOut">
               <a:rPr lang="en-US" smtClean="0"/>
-              <a:t>1/31/2023</a:t>
+              <a:t>2/2/2023</a:t>
             </a:fld>
             <a:endParaRPr lang="en-US"/>
           </a:p>
@@ -2787,7 +2872,7 @@
           <a:p>
             <a:fld id="{E7E98992-F9BC-4325-BDEC-D59B877EF259}" type="datetimeFigureOut">
               <a:rPr lang="en-US" smtClean="0"/>
-              <a:t>1/31/2023</a:t>
+              <a:t>2/2/2023</a:t>
             </a:fld>
             <a:endParaRPr lang="en-US"/>
           </a:p>
@@ -2905,7 +2990,7 @@
           <a:p>
             <a:fld id="{E7E98992-F9BC-4325-BDEC-D59B877EF259}" type="datetimeFigureOut">
               <a:rPr lang="en-US" smtClean="0"/>
-              <a:t>1/31/2023</a:t>
+              <a:t>2/2/2023</a:t>
             </a:fld>
             <a:endParaRPr lang="en-US"/>
           </a:p>
@@ -3000,7 +3085,7 @@
           <a:p>
             <a:fld id="{E7E98992-F9BC-4325-BDEC-D59B877EF259}" type="datetimeFigureOut">
               <a:rPr lang="en-US" smtClean="0"/>
-              <a:t>1/31/2023</a:t>
+              <a:t>2/2/2023</a:t>
             </a:fld>
             <a:endParaRPr lang="en-US"/>
           </a:p>
@@ -3350,7 +3435,7 @@
           <a:p>
             <a:fld id="{E7E98992-F9BC-4325-BDEC-D59B877EF259}" type="datetimeFigureOut">
               <a:rPr lang="en-US" smtClean="0"/>
-              <a:t>1/31/2023</a:t>
+              <a:t>2/2/2023</a:t>
             </a:fld>
             <a:endParaRPr lang="en-US"/>
           </a:p>
@@ -3775,7 +3860,7 @@
           <a:p>
             <a:fld id="{E7E98992-F9BC-4325-BDEC-D59B877EF259}" type="datetimeFigureOut">
               <a:rPr lang="en-US" smtClean="0"/>
-              <a:t>1/31/2023</a:t>
+              <a:t>2/2/2023</a:t>
             </a:fld>
             <a:endParaRPr lang="en-US"/>
           </a:p>
@@ -4056,7 +4141,7 @@
           <a:p>
             <a:fld id="{E7E98992-F9BC-4325-BDEC-D59B877EF259}" type="datetimeFigureOut">
               <a:rPr lang="en-US" smtClean="0"/>
-              <a:t>1/31/2023</a:t>
+              <a:t>2/2/2023</a:t>
             </a:fld>
             <a:endParaRPr lang="en-US"/>
           </a:p>
@@ -5087,7 +5172,7 @@
           <p:cNvPr id="2" name="Title 1">
             <a:extLst>
               <a:ext uri="{FF2B5EF4-FFF2-40B4-BE49-F238E27FC236}">
-                <a16:creationId xmlns:a16="http://schemas.microsoft.com/office/drawing/2014/main" id="{7F5DF0F3-1719-2780-C62C-9B940F424FBC}"/>
+                <a16:creationId xmlns:a16="http://schemas.microsoft.com/office/drawing/2014/main" xmlns="" id="{7F5DF0F3-1719-2780-C62C-9B940F424FBC}"/>
               </a:ext>
             </a:extLst>
           </p:cNvPr>
@@ -5349,7 +5434,7 @@
           <p:cNvPr id="2" name="Title 1">
             <a:extLst>
               <a:ext uri="{FF2B5EF4-FFF2-40B4-BE49-F238E27FC236}">
-                <a16:creationId xmlns:a16="http://schemas.microsoft.com/office/drawing/2014/main" id="{C4F8ED5E-2977-71E8-7B26-FDED14A70FDB}"/>
+                <a16:creationId xmlns:a16="http://schemas.microsoft.com/office/drawing/2014/main" xmlns="" id="{C4F8ED5E-2977-71E8-7B26-FDED14A70FDB}"/>
               </a:ext>
             </a:extLst>
           </p:cNvPr>
@@ -5378,7 +5463,7 @@
           <p:cNvPr id="5" name="Picture 4">
             <a:extLst>
               <a:ext uri="{FF2B5EF4-FFF2-40B4-BE49-F238E27FC236}">
-                <a16:creationId xmlns:a16="http://schemas.microsoft.com/office/drawing/2014/main" id="{3E6DC17E-7542-0B56-EDA9-60A4AEF70315}"/>
+                <a16:creationId xmlns:a16="http://schemas.microsoft.com/office/drawing/2014/main" xmlns="" id="{3E6DC17E-7542-0B56-EDA9-60A4AEF70315}"/>
               </a:ext>
             </a:extLst>
           </p:cNvPr>
@@ -5438,7 +5523,7 @@
           <p:cNvPr id="2" name="Title 1">
             <a:extLst>
               <a:ext uri="{FF2B5EF4-FFF2-40B4-BE49-F238E27FC236}">
-                <a16:creationId xmlns:a16="http://schemas.microsoft.com/office/drawing/2014/main" id="{7F5DF0F3-1719-2780-C62C-9B940F424FBC}"/>
+                <a16:creationId xmlns:a16="http://schemas.microsoft.com/office/drawing/2014/main" xmlns="" id="{7F5DF0F3-1719-2780-C62C-9B940F424FBC}"/>
               </a:ext>
             </a:extLst>
           </p:cNvPr>
@@ -5466,7 +5551,7 @@
           <p:cNvPr id="6" name="Content Placeholder 5">
             <a:extLst>
               <a:ext uri="{FF2B5EF4-FFF2-40B4-BE49-F238E27FC236}">
-                <a16:creationId xmlns:a16="http://schemas.microsoft.com/office/drawing/2014/main" id="{3C6A54C3-7B6C-30BC-6223-598BD2B6FAA4}"/>
+                <a16:creationId xmlns:a16="http://schemas.microsoft.com/office/drawing/2014/main" xmlns="" id="{3C6A54C3-7B6C-30BC-6223-598BD2B6FAA4}"/>
               </a:ext>
             </a:extLst>
           </p:cNvPr>
@@ -5482,7 +5567,168 @@
           <a:bodyPr/>
           <a:lstStyle/>
           <a:p>
-            <a:endParaRPr lang="en-US"/>
+            <a:r>
+              <a:rPr lang="en-US" dirty="0" smtClean="0"/>
+              <a:t>During initialization, </a:t>
+            </a:r>
+            <a:r>
+              <a:rPr lang="en-US" dirty="0" err="1" smtClean="0"/>
+              <a:t>simxGetVisionSensorImage</a:t>
+            </a:r>
+            <a:r>
+              <a:rPr lang="en-US" dirty="0" smtClean="0"/>
+              <a:t>() has to be called with “streaming” option once:</a:t>
+            </a:r>
+            <a:endParaRPr lang="en-US" dirty="0"/>
+          </a:p>
+          <a:p>
+            <a:pPr marL="0" indent="0">
+              <a:buNone/>
+            </a:pPr>
+            <a:r>
+              <a:rPr lang="en-US" dirty="0"/>
+              <a:t> </a:t>
+            </a:r>
+            <a:r>
+              <a:rPr lang="en-US" dirty="0">
+                <a:solidFill>
+                  <a:srgbClr val="00B050"/>
+                </a:solidFill>
+              </a:rPr>
+              <a:t>err, res, image = </a:t>
+            </a:r>
+            <a:r>
+              <a:rPr lang="en-US" dirty="0" err="1">
+                <a:solidFill>
+                  <a:srgbClr val="00B050"/>
+                </a:solidFill>
+              </a:rPr>
+              <a:t>sim.simxGetVisionSensorImage</a:t>
+            </a:r>
+            <a:r>
+              <a:rPr lang="en-US" dirty="0">
+                <a:solidFill>
+                  <a:srgbClr val="00B050"/>
+                </a:solidFill>
+              </a:rPr>
+              <a:t>(</a:t>
+            </a:r>
+            <a:r>
+              <a:rPr lang="en-US" dirty="0" err="1">
+                <a:solidFill>
+                  <a:srgbClr val="00B050"/>
+                </a:solidFill>
+              </a:rPr>
+              <a:t>clientID</a:t>
+            </a:r>
+            <a:r>
+              <a:rPr lang="en-US" dirty="0">
+                <a:solidFill>
+                  <a:srgbClr val="00B050"/>
+                </a:solidFill>
+              </a:rPr>
+              <a:t>,  </a:t>
+            </a:r>
+            <a:r>
+              <a:rPr lang="en-US" dirty="0" err="1">
+                <a:solidFill>
+                  <a:srgbClr val="00B050"/>
+                </a:solidFill>
+              </a:rPr>
+              <a:t>camHandle</a:t>
+            </a:r>
+            <a:r>
+              <a:rPr lang="en-US" dirty="0">
+                <a:solidFill>
+                  <a:srgbClr val="00B050"/>
+                </a:solidFill>
+              </a:rPr>
+              <a:t>, 0, </a:t>
+            </a:r>
+            <a:r>
+              <a:rPr lang="en-US" dirty="0" err="1">
+                <a:solidFill>
+                  <a:srgbClr val="00B050"/>
+                </a:solidFill>
+              </a:rPr>
+              <a:t>sim.simx_opmode_streaming</a:t>
+            </a:r>
+            <a:r>
+              <a:rPr lang="en-US" dirty="0">
+                <a:solidFill>
+                  <a:srgbClr val="00B050"/>
+                </a:solidFill>
+              </a:rPr>
+              <a:t>)</a:t>
+            </a:r>
+          </a:p>
+        </p:txBody>
+      </p:sp>
+      <p:cxnSp>
+        <p:nvCxnSpPr>
+          <p:cNvPr id="4" name="Straight Arrow Connector 3"/>
+          <p:cNvCxnSpPr/>
+          <p:nvPr/>
+        </p:nvCxnSpPr>
+        <p:spPr>
+          <a:xfrm>
+            <a:off x="9579429" y="3236685"/>
+            <a:ext cx="290285" cy="449943"/>
+          </a:xfrm>
+          <a:prstGeom prst="straightConnector1">
+            <a:avLst/>
+          </a:prstGeom>
+          <a:ln w="57150">
+            <a:tailEnd type="triangle"/>
+          </a:ln>
+        </p:spPr>
+        <p:style>
+          <a:lnRef idx="1">
+            <a:schemeClr val="accent1"/>
+          </a:lnRef>
+          <a:fillRef idx="0">
+            <a:schemeClr val="accent1"/>
+          </a:fillRef>
+          <a:effectRef idx="0">
+            <a:schemeClr val="accent1"/>
+          </a:effectRef>
+          <a:fontRef idx="minor">
+            <a:schemeClr val="tx1"/>
+          </a:fontRef>
+        </p:style>
+      </p:cxnSp>
+      <p:sp>
+        <p:nvSpPr>
+          <p:cNvPr id="5" name="Rectangle 4"/>
+          <p:cNvSpPr/>
+          <p:nvPr/>
+        </p:nvSpPr>
+        <p:spPr>
+          <a:xfrm>
+            <a:off x="9154305" y="3823638"/>
+            <a:ext cx="2268438" cy="646331"/>
+          </a:xfrm>
+          <a:prstGeom prst="rect">
+            <a:avLst/>
+          </a:prstGeom>
+        </p:spPr>
+        <p:txBody>
+          <a:bodyPr wrap="square">
+            <a:spAutoFit/>
+          </a:bodyPr>
+          <a:lstStyle/>
+          <a:p>
+            <a:r>
+              <a:rPr lang="en-US" dirty="0"/>
+              <a:t>0 for color image</a:t>
+            </a:r>
+          </a:p>
+          <a:p>
+            <a:r>
+              <a:rPr lang="en-US" dirty="0"/>
+              <a:t>1 for grayscale</a:t>
+            </a:r>
+            <a:endParaRPr lang="en-US" dirty="0"/>
           </a:p>
         </p:txBody>
       </p:sp>
@@ -5521,7 +5767,7 @@
           <p:cNvPr id="2" name="Title 1">
             <a:extLst>
               <a:ext uri="{FF2B5EF4-FFF2-40B4-BE49-F238E27FC236}">
-                <a16:creationId xmlns:a16="http://schemas.microsoft.com/office/drawing/2014/main" id="{7F5DF0F3-1719-2780-C62C-9B940F424FBC}"/>
+                <a16:creationId xmlns:a16="http://schemas.microsoft.com/office/drawing/2014/main" xmlns="" id="{7F5DF0F3-1719-2780-C62C-9B940F424FBC}"/>
               </a:ext>
             </a:extLst>
           </p:cNvPr>
@@ -5539,6 +5785,476 @@
           <a:p>
             <a:r>
               <a:rPr lang="en-US" dirty="0"/>
+              <a:t>Getting Images from Robot</a:t>
+            </a:r>
+          </a:p>
+        </p:txBody>
+      </p:sp>
+      <p:sp>
+        <p:nvSpPr>
+          <p:cNvPr id="6" name="Content Placeholder 5">
+            <a:extLst>
+              <a:ext uri="{FF2B5EF4-FFF2-40B4-BE49-F238E27FC236}">
+                <a16:creationId xmlns:a16="http://schemas.microsoft.com/office/drawing/2014/main" xmlns="" id="{3C6A54C3-7B6C-30BC-6223-598BD2B6FAA4}"/>
+              </a:ext>
+            </a:extLst>
+          </p:cNvPr>
+          <p:cNvSpPr>
+            <a:spLocks noGrp="1"/>
+          </p:cNvSpPr>
+          <p:nvPr>
+            <p:ph idx="1"/>
+          </p:nvPr>
+        </p:nvSpPr>
+        <p:spPr/>
+        <p:txBody>
+          <a:bodyPr/>
+          <a:lstStyle/>
+          <a:p>
+            <a:r>
+              <a:rPr lang="en-US" dirty="0" smtClean="0"/>
+              <a:t>During loop, </a:t>
+            </a:r>
+            <a:r>
+              <a:rPr lang="en-US" dirty="0" err="1" smtClean="0"/>
+              <a:t>simxGetVisionSensorImage</a:t>
+            </a:r>
+            <a:r>
+              <a:rPr lang="en-US" dirty="0" smtClean="0"/>
+              <a:t>() has to be called with “buffer” option:</a:t>
+            </a:r>
+            <a:endParaRPr lang="en-US" dirty="0"/>
+          </a:p>
+          <a:p>
+            <a:pPr marL="0" indent="0">
+              <a:buNone/>
+            </a:pPr>
+            <a:r>
+              <a:rPr lang="en-US" dirty="0">
+                <a:solidFill>
+                  <a:srgbClr val="00B050"/>
+                </a:solidFill>
+              </a:rPr>
+              <a:t> err, res, </a:t>
+            </a:r>
+            <a:r>
+              <a:rPr lang="en-US" dirty="0" err="1">
+                <a:solidFill>
+                  <a:srgbClr val="00B050"/>
+                </a:solidFill>
+              </a:rPr>
+              <a:t>image_raw</a:t>
+            </a:r>
+            <a:r>
+              <a:rPr lang="en-US" dirty="0">
+                <a:solidFill>
+                  <a:srgbClr val="00B050"/>
+                </a:solidFill>
+              </a:rPr>
+              <a:t> = </a:t>
+            </a:r>
+            <a:r>
+              <a:rPr lang="en-US" dirty="0" err="1">
+                <a:solidFill>
+                  <a:srgbClr val="00B050"/>
+                </a:solidFill>
+              </a:rPr>
+              <a:t>sim.simxGetVisionSensorImage</a:t>
+            </a:r>
+            <a:r>
+              <a:rPr lang="en-US" dirty="0">
+                <a:solidFill>
+                  <a:srgbClr val="00B050"/>
+                </a:solidFill>
+              </a:rPr>
+              <a:t>(</a:t>
+            </a:r>
+            <a:r>
+              <a:rPr lang="en-US" dirty="0" err="1">
+                <a:solidFill>
+                  <a:srgbClr val="00B050"/>
+                </a:solidFill>
+              </a:rPr>
+              <a:t>clientID</a:t>
+            </a:r>
+            <a:r>
+              <a:rPr lang="en-US" dirty="0">
+                <a:solidFill>
+                  <a:srgbClr val="00B050"/>
+                </a:solidFill>
+              </a:rPr>
+              <a:t>,  </a:t>
+            </a:r>
+            <a:r>
+              <a:rPr lang="en-US" dirty="0" err="1">
+                <a:solidFill>
+                  <a:srgbClr val="00B050"/>
+                </a:solidFill>
+              </a:rPr>
+              <a:t>camHandle</a:t>
+            </a:r>
+            <a:r>
+              <a:rPr lang="en-US" dirty="0">
+                <a:solidFill>
+                  <a:srgbClr val="00B050"/>
+                </a:solidFill>
+              </a:rPr>
+              <a:t>, 0, </a:t>
+            </a:r>
+            <a:r>
+              <a:rPr lang="en-US" dirty="0" err="1">
+                <a:solidFill>
+                  <a:srgbClr val="00B050"/>
+                </a:solidFill>
+              </a:rPr>
+              <a:t>sim.simx_opmode_buffer</a:t>
+            </a:r>
+            <a:r>
+              <a:rPr lang="en-US" dirty="0">
+                <a:solidFill>
+                  <a:srgbClr val="00B050"/>
+                </a:solidFill>
+              </a:rPr>
+              <a:t>) </a:t>
+            </a:r>
+            <a:endParaRPr lang="en-US" dirty="0" smtClean="0">
+              <a:solidFill>
+                <a:srgbClr val="00B050"/>
+              </a:solidFill>
+            </a:endParaRPr>
+          </a:p>
+          <a:p>
+            <a:r>
+              <a:rPr lang="en-US" dirty="0" smtClean="0"/>
+              <a:t>The raw image data is an unpacked array of pixel values in the red, green and blue channels.</a:t>
+            </a:r>
+          </a:p>
+          <a:p>
+            <a:r>
+              <a:rPr lang="en-US" dirty="0" smtClean="0"/>
+              <a:t>Resolution is a list of image dimensions (width, height)</a:t>
+            </a:r>
+          </a:p>
+          <a:p>
+            <a:r>
+              <a:rPr lang="en-US" dirty="0" smtClean="0"/>
+              <a:t>We need to reshape the unpacked array into the dimensions to get a proper image.</a:t>
+            </a:r>
+          </a:p>
+          <a:p>
+            <a:pPr marL="0" indent="0">
+              <a:buNone/>
+            </a:pPr>
+            <a:r>
+              <a:rPr lang="en-US" dirty="0">
+                <a:solidFill>
+                  <a:srgbClr val="00B050"/>
+                </a:solidFill>
+              </a:rPr>
+              <a:t>	</a:t>
+            </a:r>
+            <a:r>
+              <a:rPr lang="en-US" dirty="0" err="1" smtClean="0">
+                <a:solidFill>
+                  <a:srgbClr val="00B050"/>
+                </a:solidFill>
+              </a:rPr>
+              <a:t>img</a:t>
+            </a:r>
+            <a:r>
+              <a:rPr lang="en-US" dirty="0" smtClean="0">
+                <a:solidFill>
+                  <a:srgbClr val="00B050"/>
+                </a:solidFill>
+              </a:rPr>
+              <a:t> </a:t>
+            </a:r>
+            <a:r>
+              <a:rPr lang="en-US" dirty="0">
+                <a:solidFill>
+                  <a:srgbClr val="00B050"/>
+                </a:solidFill>
+              </a:rPr>
+              <a:t>= </a:t>
+            </a:r>
+            <a:r>
+              <a:rPr lang="en-US" dirty="0" err="1">
+                <a:solidFill>
+                  <a:srgbClr val="00B050"/>
+                </a:solidFill>
+              </a:rPr>
+              <a:t>np.array</a:t>
+            </a:r>
+            <a:r>
+              <a:rPr lang="en-US" dirty="0">
+                <a:solidFill>
+                  <a:srgbClr val="00B050"/>
+                </a:solidFill>
+              </a:rPr>
+              <a:t>(</a:t>
+            </a:r>
+            <a:r>
+              <a:rPr lang="en-US" dirty="0" err="1">
+                <a:solidFill>
+                  <a:srgbClr val="00B050"/>
+                </a:solidFill>
+              </a:rPr>
+              <a:t>image_raw</a:t>
+            </a:r>
+            <a:r>
+              <a:rPr lang="en-US" dirty="0">
+                <a:solidFill>
+                  <a:srgbClr val="00B050"/>
+                </a:solidFill>
+              </a:rPr>
+              <a:t>, </a:t>
+            </a:r>
+            <a:r>
+              <a:rPr lang="en-US" dirty="0" err="1">
+                <a:solidFill>
+                  <a:srgbClr val="00B050"/>
+                </a:solidFill>
+              </a:rPr>
+              <a:t>dtype</a:t>
+            </a:r>
+            <a:r>
+              <a:rPr lang="en-US" dirty="0">
+                <a:solidFill>
+                  <a:srgbClr val="00B050"/>
+                </a:solidFill>
+              </a:rPr>
+              <a:t>=np.uint8</a:t>
+            </a:r>
+            <a:r>
+              <a:rPr lang="en-US" dirty="0" smtClean="0">
+                <a:solidFill>
+                  <a:srgbClr val="00B050"/>
+                </a:solidFill>
+              </a:rPr>
+              <a:t>)  	</a:t>
+            </a:r>
+            <a:r>
+              <a:rPr lang="en-US" dirty="0" smtClean="0">
+                <a:solidFill>
+                  <a:srgbClr val="00B050"/>
+                </a:solidFill>
+                <a:sym typeface="Wingdings" panose="05000000000000000000" pitchFamily="2" charset="2"/>
+              </a:rPr>
+              <a:t> data type conversion</a:t>
+            </a:r>
+            <a:endParaRPr lang="en-US" dirty="0">
+              <a:solidFill>
+                <a:srgbClr val="00B050"/>
+              </a:solidFill>
+            </a:endParaRPr>
+          </a:p>
+          <a:p>
+            <a:pPr marL="0" indent="0">
+              <a:buNone/>
+            </a:pPr>
+            <a:r>
+              <a:rPr lang="en-US" dirty="0">
+                <a:solidFill>
+                  <a:srgbClr val="00B050"/>
+                </a:solidFill>
+              </a:rPr>
+              <a:t>    </a:t>
+            </a:r>
+            <a:r>
+              <a:rPr lang="en-US" dirty="0" smtClean="0">
+                <a:solidFill>
+                  <a:srgbClr val="00B050"/>
+                </a:solidFill>
+              </a:rPr>
+              <a:t>	</a:t>
+            </a:r>
+            <a:r>
+              <a:rPr lang="en-US" dirty="0" err="1" smtClean="0">
+                <a:solidFill>
+                  <a:srgbClr val="00B050"/>
+                </a:solidFill>
+              </a:rPr>
+              <a:t>img.resize</a:t>
+            </a:r>
+            <a:r>
+              <a:rPr lang="en-US" dirty="0">
+                <a:solidFill>
+                  <a:srgbClr val="00B050"/>
+                </a:solidFill>
+              </a:rPr>
+              <a:t>([res[1], res[0], 3</a:t>
+            </a:r>
+            <a:r>
+              <a:rPr lang="en-US" dirty="0" smtClean="0">
+                <a:solidFill>
+                  <a:srgbClr val="00B050"/>
+                </a:solidFill>
+              </a:rPr>
+              <a:t>])			</a:t>
+            </a:r>
+            <a:r>
+              <a:rPr lang="en-US" dirty="0" smtClean="0">
+                <a:solidFill>
+                  <a:srgbClr val="00B050"/>
+                </a:solidFill>
+                <a:sym typeface="Wingdings" panose="05000000000000000000" pitchFamily="2" charset="2"/>
+              </a:rPr>
+              <a:t> reshaping array</a:t>
+            </a:r>
+            <a:endParaRPr lang="en-US" dirty="0">
+              <a:solidFill>
+                <a:srgbClr val="00B050"/>
+              </a:solidFill>
+            </a:endParaRPr>
+          </a:p>
+          <a:p>
+            <a:pPr marL="0" indent="0">
+              <a:buNone/>
+            </a:pPr>
+            <a:r>
+              <a:rPr lang="en-US" dirty="0">
+                <a:solidFill>
+                  <a:srgbClr val="00B050"/>
+                </a:solidFill>
+              </a:rPr>
+              <a:t>    </a:t>
+            </a:r>
+            <a:r>
+              <a:rPr lang="en-US" dirty="0" smtClean="0">
+                <a:solidFill>
+                  <a:srgbClr val="00B050"/>
+                </a:solidFill>
+              </a:rPr>
+              <a:t>	</a:t>
+            </a:r>
+            <a:r>
+              <a:rPr lang="en-US" dirty="0" err="1" smtClean="0">
+                <a:solidFill>
+                  <a:srgbClr val="00B050"/>
+                </a:solidFill>
+              </a:rPr>
+              <a:t>img</a:t>
+            </a:r>
+            <a:r>
+              <a:rPr lang="en-US" dirty="0" smtClean="0">
+                <a:solidFill>
+                  <a:srgbClr val="00B050"/>
+                </a:solidFill>
+              </a:rPr>
+              <a:t> </a:t>
+            </a:r>
+            <a:r>
+              <a:rPr lang="en-US" dirty="0">
+                <a:solidFill>
+                  <a:srgbClr val="00B050"/>
+                </a:solidFill>
+              </a:rPr>
+              <a:t>= </a:t>
+            </a:r>
+            <a:r>
+              <a:rPr lang="en-US" dirty="0" err="1">
+                <a:solidFill>
+                  <a:srgbClr val="00B050"/>
+                </a:solidFill>
+              </a:rPr>
+              <a:t>img</a:t>
+            </a:r>
+            <a:r>
+              <a:rPr lang="en-US" dirty="0">
+                <a:solidFill>
+                  <a:srgbClr val="00B050"/>
+                </a:solidFill>
+              </a:rPr>
+              <a:t>[::-1,::-1, </a:t>
+            </a:r>
+            <a:r>
+              <a:rPr lang="en-US" dirty="0" smtClean="0">
+                <a:solidFill>
+                  <a:srgbClr val="00B050"/>
+                </a:solidFill>
+              </a:rPr>
+              <a:t>:]				</a:t>
+            </a:r>
+            <a:r>
+              <a:rPr lang="en-US" dirty="0" smtClean="0">
+                <a:solidFill>
+                  <a:srgbClr val="00B050"/>
+                </a:solidFill>
+                <a:sym typeface="Wingdings" panose="05000000000000000000" pitchFamily="2" charset="2"/>
+              </a:rPr>
+              <a:t> rotate by 180 degrees</a:t>
+            </a:r>
+            <a:endParaRPr lang="en-US" dirty="0">
+              <a:solidFill>
+                <a:srgbClr val="00B050"/>
+              </a:solidFill>
+            </a:endParaRPr>
+          </a:p>
+          <a:p>
+            <a:pPr marL="0" indent="0">
+              <a:buNone/>
+            </a:pPr>
+            <a:endParaRPr lang="en-US" dirty="0">
+              <a:solidFill>
+                <a:srgbClr val="00B050"/>
+              </a:solidFill>
+            </a:endParaRPr>
+          </a:p>
+        </p:txBody>
+      </p:sp>
+    </p:spTree>
+    <p:extLst>
+      <p:ext uri="{BB962C8B-B14F-4D97-AF65-F5344CB8AC3E}">
+        <p14:creationId xmlns:p14="http://schemas.microsoft.com/office/powerpoint/2010/main" val="1216549181"/>
+      </p:ext>
+    </p:extLst>
+  </p:cSld>
+  <p:clrMapOvr>
+    <a:masterClrMapping/>
+  </p:clrMapOvr>
+</p:sld>
+</file>
+
+<file path=ppt/slides/slide8.xml><?xml version="1.0" encoding="utf-8"?>
+<p:sld xmlns:a="http://schemas.openxmlformats.org/drawingml/2006/main" xmlns:r="http://schemas.openxmlformats.org/officeDocument/2006/relationships" xmlns:p="http://schemas.openxmlformats.org/presentationml/2006/main">
+  <p:cSld>
+    <p:spTree>
+      <p:nvGrpSpPr>
+        <p:cNvPr id="1" name=""/>
+        <p:cNvGrpSpPr/>
+        <p:nvPr/>
+      </p:nvGrpSpPr>
+      <p:grpSpPr>
+        <a:xfrm>
+          <a:off x="0" y="0"/>
+          <a:ext cx="0" cy="0"/>
+          <a:chOff x="0" y="0"/>
+          <a:chExt cx="0" cy="0"/>
+        </a:xfrm>
+      </p:grpSpPr>
+      <p:sp>
+        <p:nvSpPr>
+          <p:cNvPr id="2" name="Title 1">
+            <a:extLst>
+              <a:ext uri="{FF2B5EF4-FFF2-40B4-BE49-F238E27FC236}">
+                <a16:creationId xmlns:a16="http://schemas.microsoft.com/office/drawing/2014/main" xmlns="" id="{7F5DF0F3-1719-2780-C62C-9B940F424FBC}"/>
+              </a:ext>
+            </a:extLst>
+          </p:cNvPr>
+          <p:cNvSpPr>
+            <a:spLocks noGrp="1"/>
+          </p:cNvSpPr>
+          <p:nvPr>
+            <p:ph type="title"/>
+          </p:nvPr>
+        </p:nvSpPr>
+        <p:spPr/>
+        <p:txBody>
+          <a:bodyPr/>
+          <a:lstStyle/>
+          <a:p>
+            <a:r>
+              <a:rPr lang="en-US" dirty="0"/>
               <a:t>Head Over to the Code!</a:t>
             </a:r>
           </a:p>
@@ -5549,7 +6265,7 @@
           <p:cNvPr id="3" name="Content Placeholder 2">
             <a:extLst>
               <a:ext uri="{FF2B5EF4-FFF2-40B4-BE49-F238E27FC236}">
-                <a16:creationId xmlns:a16="http://schemas.microsoft.com/office/drawing/2014/main" id="{25EC3A3A-EAF6-6E13-A57B-9EB5FD5E4832}"/>
+                <a16:creationId xmlns:a16="http://schemas.microsoft.com/office/drawing/2014/main" xmlns="" id="{25EC3A3A-EAF6-6E13-A57B-9EB5FD5E4832}"/>
               </a:ext>
             </a:extLst>
           </p:cNvPr>
@@ -5573,21 +6289,34 @@
           <a:lstStyle/>
           <a:p>
             <a:r>
-              <a:rPr lang="en-US" b="1" dirty="0" err="1"/>
-              <a:t>Line_follower.ipynb</a:t>
-            </a:r>
-            <a:r>
-              <a:rPr lang="en-US" b="1" dirty="0"/>
+              <a:rPr lang="en-US" b="1" dirty="0" err="1" smtClean="0"/>
+              <a:t>Soccerbot.ipynb</a:t>
+            </a:r>
+            <a:r>
+              <a:rPr lang="en-US" b="1" dirty="0" smtClean="0"/>
               <a:t> </a:t>
             </a:r>
             <a:r>
+              <a:rPr lang="en-US" dirty="0" smtClean="0"/>
+              <a:t>notebook </a:t>
+            </a:r>
+            <a:r>
               <a:rPr lang="en-US" dirty="0"/>
-              <a:t>notebook contains the code for controlling the LFR in the </a:t>
-            </a:r>
-            <a:r>
-              <a:rPr lang="en-US" b="1" dirty="0"/>
-              <a:t>part3_LFR_python.ttt</a:t>
-            </a:r>
+              <a:t>contains the code for </a:t>
+            </a:r>
+            <a:r>
+              <a:rPr lang="en-US" dirty="0" smtClean="0"/>
+              <a:t>soccer bots in </a:t>
+            </a:r>
+            <a:r>
+              <a:rPr lang="en-US" b="1" dirty="0" err="1" smtClean="0"/>
+              <a:t>soccerbot</a:t>
+            </a:r>
+            <a:r>
+              <a:rPr lang="en-US" b="1" dirty="0" err="1" smtClean="0"/>
+              <a:t>.ttt</a:t>
+            </a:r>
+            <a:endParaRPr lang="en-US" b="1" dirty="0"/>
           </a:p>
           <a:p>
             <a:r>

</xml_diff>